<commit_message>
minor changes in spaces and stuff
</commit_message>
<xml_diff>
--- a/img/ins_just_ensamble/instructions2.4.19.pptx
+++ b/img/ins_just_ensamble/instructions2.4.19.pptx
@@ -5,11 +5,11 @@
     <p:sldMasterId id="2147483684" r:id="rId1"/>
   </p:sldMasterIdLst>
   <p:sldIdLst>
-    <p:sldId id="268" r:id="rId2"/>
-    <p:sldId id="257" r:id="rId3"/>
-    <p:sldId id="269" r:id="rId4"/>
-    <p:sldId id="270" r:id="rId5"/>
-    <p:sldId id="274" r:id="rId6"/>
+    <p:sldId id="276" r:id="rId2"/>
+    <p:sldId id="268" r:id="rId3"/>
+    <p:sldId id="257" r:id="rId4"/>
+    <p:sldId id="269" r:id="rId5"/>
+    <p:sldId id="270" r:id="rId6"/>
     <p:sldId id="273" r:id="rId7"/>
     <p:sldId id="263" r:id="rId8"/>
     <p:sldId id="260" r:id="rId9"/>
@@ -3033,6 +3033,80 @@
         </p:nvSpPr>
         <p:spPr>
           <a:xfrm>
+            <a:off x="732183" y="6179234"/>
+            <a:ext cx="22482312" cy="948351"/>
+          </a:xfrm>
+        </p:spPr>
+        <p:txBody>
+          <a:bodyPr>
+            <a:noAutofit/>
+          </a:bodyPr>
+          <a:lstStyle/>
+          <a:p>
+            <a:pPr algn="l"/>
+            <a:r>
+              <a:rPr lang="en-US" sz="7200" dirty="0"/>
+              <a:t>The goal of this study is to test how well you can identify whether a face was taken from a sample of similar faces or not.</a:t>
+            </a:r>
+          </a:p>
+        </p:txBody>
+      </p:sp>
+    </p:spTree>
+    <p:extLst>
+      <p:ext uri="{BB962C8B-B14F-4D97-AF65-F5344CB8AC3E}">
+        <p14:creationId xmlns:p14="http://schemas.microsoft.com/office/powerpoint/2010/main" val="1151704522"/>
+      </p:ext>
+    </p:extLst>
+  </p:cSld>
+  <p:clrMapOvr>
+    <a:masterClrMapping/>
+  </p:clrMapOvr>
+</p:sld>
+</file>
+
+<file path=ppt/slides/slide2.xml><?xml version="1.0" encoding="utf-8"?>
+<p:sld xmlns:a="http://schemas.openxmlformats.org/drawingml/2006/main" xmlns:r="http://schemas.openxmlformats.org/officeDocument/2006/relationships" xmlns:p="http://schemas.openxmlformats.org/presentationml/2006/main">
+  <p:cSld>
+    <p:bg>
+      <p:bgPr>
+        <a:solidFill>
+          <a:srgbClr val="AAAAAA"/>
+        </a:solidFill>
+        <a:effectLst/>
+      </p:bgPr>
+    </p:bg>
+    <p:spTree>
+      <p:nvGrpSpPr>
+        <p:cNvPr id="1" name=""/>
+        <p:cNvGrpSpPr/>
+        <p:nvPr/>
+      </p:nvGrpSpPr>
+      <p:grpSpPr>
+        <a:xfrm>
+          <a:off x="0" y="0"/>
+          <a:ext cx="0" cy="0"/>
+          <a:chOff x="0" y="0"/>
+          <a:chExt cx="0" cy="0"/>
+        </a:xfrm>
+      </p:grpSpPr>
+      <p:sp>
+        <p:nvSpPr>
+          <p:cNvPr id="2" name="Title 1">
+            <a:extLst>
+              <a:ext uri="{FF2B5EF4-FFF2-40B4-BE49-F238E27FC236}">
+                <a16:creationId xmlns:a16="http://schemas.microsoft.com/office/drawing/2014/main" id="{21DCC761-EEA5-3B4F-AEC8-ED98BC41E974}"/>
+              </a:ext>
+            </a:extLst>
+          </p:cNvPr>
+          <p:cNvSpPr>
+            <a:spLocks noGrp="1"/>
+          </p:cNvSpPr>
+          <p:nvPr>
+            <p:ph type="ctrTitle"/>
+          </p:nvPr>
+        </p:nvSpPr>
+        <p:spPr>
+          <a:xfrm>
             <a:off x="732183" y="3475791"/>
             <a:ext cx="22482312" cy="948351"/>
           </a:xfrm>
@@ -3046,7 +3120,7 @@
             <a:pPr algn="l"/>
             <a:r>
               <a:rPr lang="en-US" sz="7200" dirty="0"/>
-              <a:t>In this study you will first observe a face on a screen. The face will express a certain emotion, from neutral to angry. </a:t>
+              <a:t>In the first screen of each trial you will see a face. The face will express a certain emotion, from neutral to angry. </a:t>
             </a:r>
           </a:p>
         </p:txBody>
@@ -3094,340 +3168,6 @@
 </p:sld>
 </file>
 
-<file path=ppt/slides/slide2.xml><?xml version="1.0" encoding="utf-8"?>
-<p:sld xmlns:a="http://schemas.openxmlformats.org/drawingml/2006/main" xmlns:r="http://schemas.openxmlformats.org/officeDocument/2006/relationships" xmlns:p="http://schemas.openxmlformats.org/presentationml/2006/main">
-  <p:cSld>
-    <p:bg>
-      <p:bgPr>
-        <a:solidFill>
-          <a:srgbClr val="AAAAAA"/>
-        </a:solidFill>
-        <a:effectLst/>
-      </p:bgPr>
-    </p:bg>
-    <p:spTree>
-      <p:nvGrpSpPr>
-        <p:cNvPr id="1" name=""/>
-        <p:cNvGrpSpPr/>
-        <p:nvPr/>
-      </p:nvGrpSpPr>
-      <p:grpSpPr>
-        <a:xfrm>
-          <a:off x="0" y="0"/>
-          <a:ext cx="0" cy="0"/>
-          <a:chOff x="0" y="0"/>
-          <a:chExt cx="0" cy="0"/>
-        </a:xfrm>
-      </p:grpSpPr>
-      <p:sp>
-        <p:nvSpPr>
-          <p:cNvPr id="2" name="Title 1">
-            <a:extLst>
-              <a:ext uri="{FF2B5EF4-FFF2-40B4-BE49-F238E27FC236}">
-                <a16:creationId xmlns:a16="http://schemas.microsoft.com/office/drawing/2014/main" id="{21DCC761-EEA5-3B4F-AEC8-ED98BC41E974}"/>
-              </a:ext>
-            </a:extLst>
-          </p:cNvPr>
-          <p:cNvSpPr>
-            <a:spLocks noGrp="1"/>
-          </p:cNvSpPr>
-          <p:nvPr>
-            <p:ph type="ctrTitle"/>
-          </p:nvPr>
-        </p:nvSpPr>
-        <p:spPr>
-          <a:xfrm>
-            <a:off x="840456" y="5738641"/>
-            <a:ext cx="23033336" cy="1783502"/>
-          </a:xfrm>
-        </p:spPr>
-        <p:txBody>
-          <a:bodyPr>
-            <a:noAutofit/>
-          </a:bodyPr>
-          <a:lstStyle/>
-          <a:p>
-            <a:pPr algn="l">
-              <a:lnSpc>
-                <a:spcPts val="6320"/>
-              </a:lnSpc>
-            </a:pPr>
-            <a:br>
-              <a:rPr lang="en-US" altLang="zh-CN" sz="6000" dirty="0">
-                <a:cs typeface="Arial" panose="020B0604020202020204" pitchFamily="34" charset="0"/>
-              </a:rPr>
-            </a:br>
-            <a:br>
-              <a:rPr lang="en-US" altLang="zh-CN" sz="6000" dirty="0">
-                <a:cs typeface="Arial" panose="020B0604020202020204" pitchFamily="34" charset="0"/>
-              </a:rPr>
-            </a:br>
-            <a:r>
-              <a:rPr lang="en-US" sz="6000" dirty="0">
-                <a:cs typeface="Arial" panose="020B0604020202020204" pitchFamily="34" charset="0"/>
-              </a:rPr>
-              <a:t>​Following the </a:t>
-            </a:r>
-            <a:r>
-              <a:rPr lang="en-US" altLang="zh-CN" sz="6000" dirty="0">
-                <a:cs typeface="Arial" panose="020B0604020202020204" pitchFamily="34" charset="0"/>
-              </a:rPr>
-              <a:t>picture</a:t>
-            </a:r>
-            <a:r>
-              <a:rPr lang="en-US" sz="6000" dirty="0">
-                <a:cs typeface="Arial" panose="020B0604020202020204" pitchFamily="34" charset="0"/>
-              </a:rPr>
-              <a:t>, a </a:t>
-            </a:r>
-            <a:r>
-              <a:rPr lang="en-US" altLang="zh-CN" sz="6000" dirty="0">
-                <a:cs typeface="Arial" panose="020B0604020202020204" pitchFamily="34" charset="0"/>
-              </a:rPr>
-              <a:t>scale</a:t>
-            </a:r>
-            <a:r>
-              <a:rPr lang="en-US" sz="6000" dirty="0">
-                <a:cs typeface="Arial" panose="020B0604020202020204" pitchFamily="34" charset="0"/>
-              </a:rPr>
-              <a:t> will appear in the middle of the screen.  </a:t>
-            </a:r>
-            <a:br>
-              <a:rPr lang="en-US" sz="6000" dirty="0">
-                <a:cs typeface="Arial" panose="020B0604020202020204" pitchFamily="34" charset="0"/>
-              </a:rPr>
-            </a:br>
-            <a:br>
-              <a:rPr lang="en-US" sz="6000" dirty="0">
-                <a:cs typeface="Arial" panose="020B0604020202020204" pitchFamily="34" charset="0"/>
-              </a:rPr>
-            </a:br>
-            <a:r>
-              <a:rPr lang="en-US" sz="6000" dirty="0">
-                <a:cs typeface="Arial" panose="020B0604020202020204" pitchFamily="34" charset="0"/>
-              </a:rPr>
-              <a:t>By </a:t>
-            </a:r>
-            <a:r>
-              <a:rPr lang="en-US" altLang="zh-CN" sz="6000" dirty="0">
-                <a:cs typeface="Arial" panose="020B0604020202020204" pitchFamily="34" charset="0"/>
-              </a:rPr>
-              <a:t>moving the indicator</a:t>
-            </a:r>
-            <a:r>
-              <a:rPr lang="en-US" sz="6000" dirty="0">
-                <a:cs typeface="Arial" panose="020B0604020202020204" pitchFamily="34" charset="0"/>
-              </a:rPr>
-              <a:t>, </a:t>
-            </a:r>
-            <a:r>
-              <a:rPr lang="en-US" sz="6000" b="1" dirty="0">
-                <a:cs typeface="Arial" panose="020B0604020202020204" pitchFamily="34" charset="0"/>
-              </a:rPr>
-              <a:t>you are </a:t>
-            </a:r>
-            <a:r>
-              <a:rPr lang="en-US" altLang="zh-CN" sz="6000" b="1" dirty="0">
-                <a:cs typeface="Arial" panose="020B0604020202020204" pitchFamily="34" charset="0"/>
-              </a:rPr>
-              <a:t>asked</a:t>
-            </a:r>
-            <a:r>
-              <a:rPr lang="zh-CN" altLang="en-US" sz="6000" b="1" dirty="0">
-                <a:cs typeface="Arial" panose="020B0604020202020204" pitchFamily="34" charset="0"/>
-              </a:rPr>
-              <a:t> </a:t>
-            </a:r>
-            <a:r>
-              <a:rPr lang="en-US" altLang="zh-CN" sz="6000" b="1" dirty="0">
-                <a:cs typeface="Arial" panose="020B0604020202020204" pitchFamily="34" charset="0"/>
-              </a:rPr>
-              <a:t>to</a:t>
-            </a:r>
-            <a:r>
-              <a:rPr lang="zh-CN" altLang="en-US" sz="6000" b="1" dirty="0">
-                <a:cs typeface="Arial" panose="020B0604020202020204" pitchFamily="34" charset="0"/>
-              </a:rPr>
-              <a:t> </a:t>
-            </a:r>
-            <a:r>
-              <a:rPr lang="en-US" altLang="zh-CN" sz="6000" b="1" dirty="0">
-                <a:cs typeface="Arial" panose="020B0604020202020204" pitchFamily="34" charset="0"/>
-              </a:rPr>
-              <a:t>estimate the emotion expressed by the face you just saw</a:t>
-            </a:r>
-            <a:r>
-              <a:rPr lang="en-US" sz="6000" b="1" dirty="0">
-                <a:cs typeface="Arial" panose="020B0604020202020204" pitchFamily="34" charset="0"/>
-              </a:rPr>
-              <a:t>. </a:t>
-            </a:r>
-            <a:br>
-              <a:rPr lang="en-US" sz="6000" b="1" dirty="0">
-                <a:cs typeface="Arial" panose="020B0604020202020204" pitchFamily="34" charset="0"/>
-              </a:rPr>
-            </a:br>
-            <a:br>
-              <a:rPr lang="en-US" sz="6000" b="1" dirty="0">
-                <a:cs typeface="Arial" panose="020B0604020202020204" pitchFamily="34" charset="0"/>
-              </a:rPr>
-            </a:br>
-            <a:r>
-              <a:rPr lang="en-US" sz="6000" dirty="0">
-                <a:cs typeface="Arial" panose="020B0604020202020204" pitchFamily="34" charset="0"/>
-              </a:rPr>
-              <a:t>In order to estimate the emotion you just saw you need to move the scale and click on it. Once you </a:t>
-            </a:r>
-            <a:r>
-              <a:rPr lang="en-US" altLang="zh-CN" sz="6000" dirty="0">
-                <a:cs typeface="Arial" panose="020B0604020202020204" pitchFamily="34" charset="0"/>
-              </a:rPr>
-              <a:t>click</a:t>
-            </a:r>
-            <a:r>
-              <a:rPr lang="zh-CN" altLang="en-US" sz="6000" dirty="0">
-                <a:cs typeface="Arial" panose="020B0604020202020204" pitchFamily="34" charset="0"/>
-              </a:rPr>
-              <a:t> </a:t>
-            </a:r>
-            <a:r>
-              <a:rPr lang="en-US" altLang="zh-CN" sz="6000" dirty="0">
-                <a:cs typeface="Arial" panose="020B0604020202020204" pitchFamily="34" charset="0"/>
-              </a:rPr>
-              <a:t>on the</a:t>
-            </a:r>
-            <a:r>
-              <a:rPr lang="zh-CN" altLang="en-US" sz="6000" dirty="0">
-                <a:cs typeface="Arial" panose="020B0604020202020204" pitchFamily="34" charset="0"/>
-              </a:rPr>
-              <a:t> </a:t>
-            </a:r>
-            <a:r>
-              <a:rPr lang="en-US" altLang="zh-CN" sz="6000" dirty="0">
-                <a:cs typeface="Arial" panose="020B0604020202020204" pitchFamily="34" charset="0"/>
-              </a:rPr>
-              <a:t>scale,</a:t>
-            </a:r>
-            <a:r>
-              <a:rPr lang="zh-CN" altLang="en-US" sz="6000" dirty="0">
-                <a:cs typeface="Arial" panose="020B0604020202020204" pitchFamily="34" charset="0"/>
-              </a:rPr>
-              <a:t> </a:t>
-            </a:r>
-            <a:r>
-              <a:rPr lang="en-US" altLang="zh-CN" sz="6000" dirty="0">
-                <a:cs typeface="Arial" panose="020B0604020202020204" pitchFamily="34" charset="0"/>
-              </a:rPr>
-              <a:t>it</a:t>
-            </a:r>
-            <a:r>
-              <a:rPr lang="zh-CN" altLang="en-US" sz="6000" dirty="0">
-                <a:cs typeface="Arial" panose="020B0604020202020204" pitchFamily="34" charset="0"/>
-              </a:rPr>
-              <a:t> </a:t>
-            </a:r>
-            <a:r>
-              <a:rPr lang="en-US" altLang="zh-CN" sz="6000" dirty="0">
-                <a:cs typeface="Arial" panose="020B0604020202020204" pitchFamily="34" charset="0"/>
-              </a:rPr>
-              <a:t>will</a:t>
-            </a:r>
-            <a:r>
-              <a:rPr lang="zh-CN" altLang="en-US" sz="6000" dirty="0">
-                <a:cs typeface="Arial" panose="020B0604020202020204" pitchFamily="34" charset="0"/>
-              </a:rPr>
-              <a:t> </a:t>
-            </a:r>
-            <a:r>
-              <a:rPr lang="en-US" altLang="zh-CN" sz="6000" dirty="0">
-                <a:cs typeface="Arial" panose="020B0604020202020204" pitchFamily="34" charset="0"/>
-              </a:rPr>
-              <a:t>move to</a:t>
-            </a:r>
-            <a:r>
-              <a:rPr lang="zh-CN" altLang="en-US" sz="6000" dirty="0">
-                <a:cs typeface="Arial" panose="020B0604020202020204" pitchFamily="34" charset="0"/>
-              </a:rPr>
-              <a:t> </a:t>
-            </a:r>
-            <a:r>
-              <a:rPr lang="en-US" altLang="zh-CN" sz="6000" dirty="0">
-                <a:cs typeface="Arial" panose="020B0604020202020204" pitchFamily="34" charset="0"/>
-              </a:rPr>
-              <a:t>the</a:t>
-            </a:r>
-            <a:r>
-              <a:rPr lang="zh-CN" altLang="en-US" sz="6000" dirty="0">
-                <a:cs typeface="Arial" panose="020B0604020202020204" pitchFamily="34" charset="0"/>
-              </a:rPr>
-              <a:t> </a:t>
-            </a:r>
-            <a:r>
-              <a:rPr lang="en-US" altLang="zh-CN" sz="6000" dirty="0">
-                <a:cs typeface="Arial" panose="020B0604020202020204" pitchFamily="34" charset="0"/>
-              </a:rPr>
-              <a:t>next</a:t>
-            </a:r>
-            <a:r>
-              <a:rPr lang="zh-CN" altLang="en-US" sz="6000" dirty="0">
-                <a:cs typeface="Arial" panose="020B0604020202020204" pitchFamily="34" charset="0"/>
-              </a:rPr>
-              <a:t> </a:t>
-            </a:r>
-            <a:r>
-              <a:rPr lang="en-US" altLang="zh-CN" sz="6000" dirty="0">
-                <a:cs typeface="Arial" panose="020B0604020202020204" pitchFamily="34" charset="0"/>
-              </a:rPr>
-              <a:t>page.</a:t>
-            </a:r>
-            <a:endParaRPr lang="en-US" sz="6000" dirty="0">
-              <a:cs typeface="Arial" panose="020B0604020202020204" pitchFamily="34" charset="0"/>
-            </a:endParaRPr>
-          </a:p>
-        </p:txBody>
-      </p:sp>
-      <p:pic>
-        <p:nvPicPr>
-          <p:cNvPr id="4" name="Picture 3">
-            <a:extLst>
-              <a:ext uri="{FF2B5EF4-FFF2-40B4-BE49-F238E27FC236}">
-                <a16:creationId xmlns:a16="http://schemas.microsoft.com/office/drawing/2014/main" id="{CCEC45F3-A359-A146-8B90-BF07B89546D5}"/>
-              </a:ext>
-            </a:extLst>
-          </p:cNvPr>
-          <p:cNvPicPr>
-            <a:picLocks noChangeAspect="1"/>
-          </p:cNvPicPr>
-          <p:nvPr/>
-        </p:nvPicPr>
-        <p:blipFill rotWithShape="1">
-          <a:blip r:embed="rId2"/>
-          <a:srcRect b="42026"/>
-          <a:stretch/>
-        </p:blipFill>
-        <p:spPr>
-          <a:xfrm>
-            <a:off x="840456" y="8084931"/>
-            <a:ext cx="22703089" cy="3504095"/>
-          </a:xfrm>
-          <a:prstGeom prst="rect">
-            <a:avLst/>
-          </a:prstGeom>
-        </p:spPr>
-      </p:pic>
-    </p:spTree>
-    <p:extLst>
-      <p:ext uri="{BB962C8B-B14F-4D97-AF65-F5344CB8AC3E}">
-        <p14:creationId xmlns:p14="http://schemas.microsoft.com/office/powerpoint/2010/main" val="1787496859"/>
-      </p:ext>
-    </p:extLst>
-  </p:cSld>
-  <p:clrMapOvr>
-    <a:masterClrMapping/>
-  </p:clrMapOvr>
-</p:sld>
-</file>
-
 <file path=ppt/slides/slide3.xml><?xml version="1.0" encoding="utf-8"?>
 <p:sld xmlns:a="http://schemas.openxmlformats.org/drawingml/2006/main" xmlns:r="http://schemas.openxmlformats.org/officeDocument/2006/relationships" xmlns:p="http://schemas.openxmlformats.org/presentationml/2006/main">
   <p:cSld>
@@ -3455,6 +3195,355 @@
       </p:grpSpPr>
       <p:sp>
         <p:nvSpPr>
+          <p:cNvPr id="2" name="Title 1">
+            <a:extLst>
+              <a:ext uri="{FF2B5EF4-FFF2-40B4-BE49-F238E27FC236}">
+                <a16:creationId xmlns:a16="http://schemas.microsoft.com/office/drawing/2014/main" id="{21DCC761-EEA5-3B4F-AEC8-ED98BC41E974}"/>
+              </a:ext>
+            </a:extLst>
+          </p:cNvPr>
+          <p:cNvSpPr>
+            <a:spLocks noGrp="1"/>
+          </p:cNvSpPr>
+          <p:nvPr>
+            <p:ph type="ctrTitle"/>
+          </p:nvPr>
+        </p:nvSpPr>
+        <p:spPr>
+          <a:xfrm>
+            <a:off x="840456" y="6858000"/>
+            <a:ext cx="23033336" cy="1783502"/>
+          </a:xfrm>
+        </p:spPr>
+        <p:txBody>
+          <a:bodyPr>
+            <a:noAutofit/>
+          </a:bodyPr>
+          <a:lstStyle/>
+          <a:p>
+            <a:pPr algn="l">
+              <a:lnSpc>
+                <a:spcPts val="6320"/>
+              </a:lnSpc>
+            </a:pPr>
+            <a:br>
+              <a:rPr lang="en-US" altLang="zh-CN" sz="6000" dirty="0">
+                <a:cs typeface="Arial" panose="020B0604020202020204" pitchFamily="34" charset="0"/>
+              </a:rPr>
+            </a:br>
+            <a:br>
+              <a:rPr lang="en-US" altLang="zh-CN" sz="6000" dirty="0">
+                <a:cs typeface="Arial" panose="020B0604020202020204" pitchFamily="34" charset="0"/>
+              </a:rPr>
+            </a:br>
+            <a:r>
+              <a:rPr lang="en-US" sz="6000" dirty="0">
+                <a:cs typeface="Arial" panose="020B0604020202020204" pitchFamily="34" charset="0"/>
+              </a:rPr>
+              <a:t>​Following the </a:t>
+            </a:r>
+            <a:r>
+              <a:rPr lang="en-US" altLang="zh-CN" sz="6000" dirty="0">
+                <a:cs typeface="Arial" panose="020B0604020202020204" pitchFamily="34" charset="0"/>
+              </a:rPr>
+              <a:t>picture</a:t>
+            </a:r>
+            <a:r>
+              <a:rPr lang="en-US" sz="6000" dirty="0">
+                <a:cs typeface="Arial" panose="020B0604020202020204" pitchFamily="34" charset="0"/>
+              </a:rPr>
+              <a:t>, a </a:t>
+            </a:r>
+            <a:r>
+              <a:rPr lang="en-US" altLang="zh-CN" sz="6000" dirty="0">
+                <a:cs typeface="Arial" panose="020B0604020202020204" pitchFamily="34" charset="0"/>
+              </a:rPr>
+              <a:t>scale</a:t>
+            </a:r>
+            <a:r>
+              <a:rPr lang="en-US" sz="6000" dirty="0">
+                <a:cs typeface="Arial" panose="020B0604020202020204" pitchFamily="34" charset="0"/>
+              </a:rPr>
+              <a:t> will appear in the middle of the screen.  </a:t>
+            </a:r>
+            <a:br>
+              <a:rPr lang="en-US" sz="6000" dirty="0">
+                <a:cs typeface="Arial" panose="020B0604020202020204" pitchFamily="34" charset="0"/>
+              </a:rPr>
+            </a:br>
+            <a:br>
+              <a:rPr lang="en-US" sz="6000" dirty="0">
+                <a:cs typeface="Arial" panose="020B0604020202020204" pitchFamily="34" charset="0"/>
+              </a:rPr>
+            </a:br>
+            <a:r>
+              <a:rPr lang="en-US" sz="6000" dirty="0">
+                <a:cs typeface="Arial" panose="020B0604020202020204" pitchFamily="34" charset="0"/>
+              </a:rPr>
+              <a:t>By </a:t>
+            </a:r>
+            <a:r>
+              <a:rPr lang="en-US" altLang="zh-CN" sz="6000" dirty="0">
+                <a:cs typeface="Arial" panose="020B0604020202020204" pitchFamily="34" charset="0"/>
+              </a:rPr>
+              <a:t>moving the indicator</a:t>
+            </a:r>
+            <a:r>
+              <a:rPr lang="en-US" sz="6000" dirty="0">
+                <a:cs typeface="Arial" panose="020B0604020202020204" pitchFamily="34" charset="0"/>
+              </a:rPr>
+              <a:t>, </a:t>
+            </a:r>
+            <a:r>
+              <a:rPr lang="en-US" sz="6000" b="1" dirty="0">
+                <a:cs typeface="Arial" panose="020B0604020202020204" pitchFamily="34" charset="0"/>
+              </a:rPr>
+              <a:t>you are </a:t>
+            </a:r>
+            <a:r>
+              <a:rPr lang="en-US" altLang="zh-CN" sz="6000" b="1" dirty="0">
+                <a:cs typeface="Arial" panose="020B0604020202020204" pitchFamily="34" charset="0"/>
+              </a:rPr>
+              <a:t>asked</a:t>
+            </a:r>
+            <a:r>
+              <a:rPr lang="zh-CN" altLang="en-US" sz="6000" b="1" dirty="0">
+                <a:cs typeface="Arial" panose="020B0604020202020204" pitchFamily="34" charset="0"/>
+              </a:rPr>
+              <a:t> </a:t>
+            </a:r>
+            <a:r>
+              <a:rPr lang="en-US" altLang="zh-CN" sz="6000" b="1" dirty="0">
+                <a:cs typeface="Arial" panose="020B0604020202020204" pitchFamily="34" charset="0"/>
+              </a:rPr>
+              <a:t>to</a:t>
+            </a:r>
+            <a:r>
+              <a:rPr lang="zh-CN" altLang="en-US" sz="6000" b="1" dirty="0">
+                <a:cs typeface="Arial" panose="020B0604020202020204" pitchFamily="34" charset="0"/>
+              </a:rPr>
+              <a:t> </a:t>
+            </a:r>
+            <a:r>
+              <a:rPr lang="en-US" altLang="zh-CN" sz="6000" b="1" dirty="0">
+                <a:cs typeface="Arial" panose="020B0604020202020204" pitchFamily="34" charset="0"/>
+              </a:rPr>
+              <a:t>estimate the emotion expressed by the face you just saw</a:t>
+            </a:r>
+            <a:r>
+              <a:rPr lang="en-US" sz="6000" b="1" dirty="0">
+                <a:cs typeface="Arial" panose="020B0604020202020204" pitchFamily="34" charset="0"/>
+              </a:rPr>
+              <a:t>. </a:t>
+            </a:r>
+            <a:r>
+              <a:rPr lang="en-US" sz="6000" dirty="0">
+                <a:cs typeface="Arial" panose="020B0604020202020204" pitchFamily="34" charset="0"/>
+              </a:rPr>
+              <a:t>This step is designed </a:t>
+            </a:r>
+            <a:r>
+              <a:rPr lang="en-US" sz="6000" dirty="0">
+                <a:solidFill>
+                  <a:srgbClr val="FF0000"/>
+                </a:solidFill>
+                <a:cs typeface="Arial" panose="020B0604020202020204" pitchFamily="34" charset="0"/>
+              </a:rPr>
+              <a:t>to validate that you indeed saw the face.</a:t>
+            </a:r>
+            <a:br>
+              <a:rPr lang="en-US" sz="6000" b="1" dirty="0">
+                <a:cs typeface="Arial" panose="020B0604020202020204" pitchFamily="34" charset="0"/>
+              </a:rPr>
+            </a:br>
+            <a:br>
+              <a:rPr lang="en-US" sz="6000" b="1" dirty="0">
+                <a:cs typeface="Arial" panose="020B0604020202020204" pitchFamily="34" charset="0"/>
+              </a:rPr>
+            </a:br>
+            <a:r>
+              <a:rPr lang="en-US" sz="6000" dirty="0">
+                <a:cs typeface="Arial" panose="020B0604020202020204" pitchFamily="34" charset="0"/>
+              </a:rPr>
+              <a:t>In order to estimate the emotion you just saw, you need to move the scale and click on it. Once you </a:t>
+            </a:r>
+            <a:r>
+              <a:rPr lang="en-US" altLang="zh-CN" sz="6000" dirty="0">
+                <a:cs typeface="Arial" panose="020B0604020202020204" pitchFamily="34" charset="0"/>
+              </a:rPr>
+              <a:t>click</a:t>
+            </a:r>
+            <a:r>
+              <a:rPr lang="zh-CN" altLang="en-US" sz="6000" dirty="0">
+                <a:cs typeface="Arial" panose="020B0604020202020204" pitchFamily="34" charset="0"/>
+              </a:rPr>
+              <a:t> </a:t>
+            </a:r>
+            <a:r>
+              <a:rPr lang="en-US" altLang="zh-CN" sz="6000" dirty="0">
+                <a:cs typeface="Arial" panose="020B0604020202020204" pitchFamily="34" charset="0"/>
+              </a:rPr>
+              <a:t>on the</a:t>
+            </a:r>
+            <a:r>
+              <a:rPr lang="zh-CN" altLang="en-US" sz="6000" dirty="0">
+                <a:cs typeface="Arial" panose="020B0604020202020204" pitchFamily="34" charset="0"/>
+              </a:rPr>
+              <a:t> </a:t>
+            </a:r>
+            <a:r>
+              <a:rPr lang="en-US" altLang="zh-CN" sz="6000" dirty="0">
+                <a:cs typeface="Arial" panose="020B0604020202020204" pitchFamily="34" charset="0"/>
+              </a:rPr>
+              <a:t>scale,</a:t>
+            </a:r>
+            <a:r>
+              <a:rPr lang="zh-CN" altLang="en-US" sz="6000" dirty="0">
+                <a:cs typeface="Arial" panose="020B0604020202020204" pitchFamily="34" charset="0"/>
+              </a:rPr>
+              <a:t> </a:t>
+            </a:r>
+            <a:r>
+              <a:rPr lang="en-US" altLang="zh-CN" sz="6000" dirty="0">
+                <a:cs typeface="Arial" panose="020B0604020202020204" pitchFamily="34" charset="0"/>
+              </a:rPr>
+              <a:t>it</a:t>
+            </a:r>
+            <a:r>
+              <a:rPr lang="zh-CN" altLang="en-US" sz="6000" dirty="0">
+                <a:cs typeface="Arial" panose="020B0604020202020204" pitchFamily="34" charset="0"/>
+              </a:rPr>
+              <a:t> </a:t>
+            </a:r>
+            <a:r>
+              <a:rPr lang="en-US" altLang="zh-CN" sz="6000" dirty="0">
+                <a:cs typeface="Arial" panose="020B0604020202020204" pitchFamily="34" charset="0"/>
+              </a:rPr>
+              <a:t>will</a:t>
+            </a:r>
+            <a:r>
+              <a:rPr lang="zh-CN" altLang="en-US" sz="6000" dirty="0">
+                <a:cs typeface="Arial" panose="020B0604020202020204" pitchFamily="34" charset="0"/>
+              </a:rPr>
+              <a:t> </a:t>
+            </a:r>
+            <a:r>
+              <a:rPr lang="en-US" altLang="zh-CN" sz="6000" dirty="0">
+                <a:cs typeface="Arial" panose="020B0604020202020204" pitchFamily="34" charset="0"/>
+              </a:rPr>
+              <a:t>move to</a:t>
+            </a:r>
+            <a:r>
+              <a:rPr lang="zh-CN" altLang="en-US" sz="6000" dirty="0">
+                <a:cs typeface="Arial" panose="020B0604020202020204" pitchFamily="34" charset="0"/>
+              </a:rPr>
+              <a:t> </a:t>
+            </a:r>
+            <a:r>
+              <a:rPr lang="en-US" altLang="zh-CN" sz="6000" dirty="0">
+                <a:cs typeface="Arial" panose="020B0604020202020204" pitchFamily="34" charset="0"/>
+              </a:rPr>
+              <a:t>the</a:t>
+            </a:r>
+            <a:r>
+              <a:rPr lang="zh-CN" altLang="en-US" sz="6000" dirty="0">
+                <a:cs typeface="Arial" panose="020B0604020202020204" pitchFamily="34" charset="0"/>
+              </a:rPr>
+              <a:t> </a:t>
+            </a:r>
+            <a:r>
+              <a:rPr lang="en-US" altLang="zh-CN" sz="6000" dirty="0">
+                <a:cs typeface="Arial" panose="020B0604020202020204" pitchFamily="34" charset="0"/>
+              </a:rPr>
+              <a:t>next</a:t>
+            </a:r>
+            <a:r>
+              <a:rPr lang="zh-CN" altLang="en-US" sz="6000" dirty="0">
+                <a:cs typeface="Arial" panose="020B0604020202020204" pitchFamily="34" charset="0"/>
+              </a:rPr>
+              <a:t> </a:t>
+            </a:r>
+            <a:r>
+              <a:rPr lang="en-US" altLang="zh-CN" sz="6000" dirty="0">
+                <a:cs typeface="Arial" panose="020B0604020202020204" pitchFamily="34" charset="0"/>
+              </a:rPr>
+              <a:t>page.</a:t>
+            </a:r>
+            <a:endParaRPr lang="en-US" sz="6000" dirty="0">
+              <a:cs typeface="Arial" panose="020B0604020202020204" pitchFamily="34" charset="0"/>
+            </a:endParaRPr>
+          </a:p>
+        </p:txBody>
+      </p:sp>
+      <p:pic>
+        <p:nvPicPr>
+          <p:cNvPr id="4" name="Picture 3">
+            <a:extLst>
+              <a:ext uri="{FF2B5EF4-FFF2-40B4-BE49-F238E27FC236}">
+                <a16:creationId xmlns:a16="http://schemas.microsoft.com/office/drawing/2014/main" id="{CCEC45F3-A359-A146-8B90-BF07B89546D5}"/>
+              </a:ext>
+            </a:extLst>
+          </p:cNvPr>
+          <p:cNvPicPr>
+            <a:picLocks noChangeAspect="1"/>
+          </p:cNvPicPr>
+          <p:nvPr/>
+        </p:nvPicPr>
+        <p:blipFill rotWithShape="1">
+          <a:blip r:embed="rId2"/>
+          <a:srcRect b="42026"/>
+          <a:stretch/>
+        </p:blipFill>
+        <p:spPr>
+          <a:xfrm>
+            <a:off x="840455" y="9337262"/>
+            <a:ext cx="22703089" cy="3504095"/>
+          </a:xfrm>
+          <a:prstGeom prst="rect">
+            <a:avLst/>
+          </a:prstGeom>
+        </p:spPr>
+      </p:pic>
+    </p:spTree>
+    <p:extLst>
+      <p:ext uri="{BB962C8B-B14F-4D97-AF65-F5344CB8AC3E}">
+        <p14:creationId xmlns:p14="http://schemas.microsoft.com/office/powerpoint/2010/main" val="1787496859"/>
+      </p:ext>
+    </p:extLst>
+  </p:cSld>
+  <p:clrMapOvr>
+    <a:masterClrMapping/>
+  </p:clrMapOvr>
+</p:sld>
+</file>
+
+<file path=ppt/slides/slide4.xml><?xml version="1.0" encoding="utf-8"?>
+<p:sld xmlns:a="http://schemas.openxmlformats.org/drawingml/2006/main" xmlns:r="http://schemas.openxmlformats.org/officeDocument/2006/relationships" xmlns:p="http://schemas.openxmlformats.org/presentationml/2006/main">
+  <p:cSld>
+    <p:bg>
+      <p:bgPr>
+        <a:solidFill>
+          <a:srgbClr val="AAAAAA"/>
+        </a:solidFill>
+        <a:effectLst/>
+      </p:bgPr>
+    </p:bg>
+    <p:spTree>
+      <p:nvGrpSpPr>
+        <p:cNvPr id="1" name=""/>
+        <p:cNvGrpSpPr/>
+        <p:nvPr/>
+      </p:nvGrpSpPr>
+      <p:grpSpPr>
+        <a:xfrm>
+          <a:off x="0" y="0"/>
+          <a:ext cx="0" cy="0"/>
+          <a:chOff x="0" y="0"/>
+          <a:chExt cx="0" cy="0"/>
+        </a:xfrm>
+      </p:grpSpPr>
+      <p:sp>
+        <p:nvSpPr>
           <p:cNvPr id="7" name="Title 1">
             <a:extLst>
               <a:ext uri="{FF2B5EF4-FFF2-40B4-BE49-F238E27FC236}">
@@ -3469,8 +3558,8 @@
         </p:nvSpPr>
         <p:spPr>
           <a:xfrm>
-            <a:off x="381000" y="2429900"/>
-            <a:ext cx="24143341" cy="1783502"/>
+            <a:off x="381001" y="2429900"/>
+            <a:ext cx="23830722" cy="1783502"/>
           </a:xfrm>
           <a:prstGeom prst="rect">
             <a:avLst/>
@@ -3516,7 +3605,7 @@
                 <a:latin typeface="Arial" panose="020B0604020202020204" pitchFamily="34" charset="0"/>
                 <a:cs typeface="Arial" panose="020B0604020202020204" pitchFamily="34" charset="0"/>
               </a:rPr>
-              <a:t>Remember, the goal here is to click one point on the scale that estimates THE EMOTION YOU JUST SAW.</a:t>
+              <a:t>Remember, the goal here is to click on the point of the scale that is identical to the EMOTION YOU JUST SAW.</a:t>
             </a:r>
           </a:p>
         </p:txBody>
@@ -3563,7 +3652,7 @@
 </p:sld>
 </file>
 
-<file path=ppt/slides/slide4.xml><?xml version="1.0" encoding="utf-8"?>
+<file path=ppt/slides/slide5.xml><?xml version="1.0" encoding="utf-8"?>
 <p:sld xmlns:a="http://schemas.openxmlformats.org/drawingml/2006/main" xmlns:r="http://schemas.openxmlformats.org/officeDocument/2006/relationships" xmlns:p="http://schemas.openxmlformats.org/presentationml/2006/main">
   <p:cSld>
     <p:bg>
@@ -3619,7 +3708,7 @@
             <a:pPr algn="l"/>
             <a:r>
               <a:rPr lang="en-US" sz="6000" dirty="0"/>
-              <a:t>Following your rating you will see 12 other faces. These faces will appear only for 1 second.  In order to take all the ratings in, try to expand your attention to the four corners of the screen.   </a:t>
+              <a:t>Following your rating, you will see 12 other faces. These faces will appear only for 1 second.  In order to take all the ratings in, try to expand your attention to the four corners of the screen.   </a:t>
             </a:r>
             <a:br>
               <a:rPr lang="en-US" sz="6000" dirty="0"/>
@@ -3946,7 +4035,7 @@
 </p:sld>
 </file>
 
-<file path=ppt/slides/slide5.xml><?xml version="1.0" encoding="utf-8"?>
+<file path=ppt/slides/slide6.xml><?xml version="1.0" encoding="utf-8"?>
 <p:sld xmlns:a="http://schemas.openxmlformats.org/drawingml/2006/main" xmlns:r="http://schemas.openxmlformats.org/officeDocument/2006/relationships" xmlns:p="http://schemas.openxmlformats.org/presentationml/2006/main">
   <p:cSld>
     <p:bg>
@@ -3989,8 +4078,8 @@
         </p:nvSpPr>
         <p:spPr>
           <a:xfrm>
-            <a:off x="431800" y="2963418"/>
-            <a:ext cx="24434800" cy="1484589"/>
+            <a:off x="457200" y="3408336"/>
+            <a:ext cx="23742782" cy="1484589"/>
           </a:xfrm>
         </p:spPr>
         <p:txBody>
@@ -4000,27 +4089,18 @@
           <a:lstStyle/>
           <a:p>
             <a:pPr algn="l"/>
-            <a:br>
-              <a:rPr lang="en-US" sz="4400" dirty="0"/>
-            </a:br>
-            <a:r>
-              <a:rPr lang="en-US" sz="5400" dirty="0"/>
-              <a:t>Their ratings were either sampled from participants who were previously assigned to YOUR GROUP or participants who were assigned to the OTHER GROUP.</a:t>
-            </a:r>
-            <a:br>
-              <a:rPr lang="en-US" sz="5400" dirty="0"/>
-            </a:br>
-            <a:r>
-              <a:rPr lang="en-US" sz="2000" dirty="0"/>
-              <a:t> </a:t>
-            </a:r>
-            <a:br>
-              <a:rPr lang="en-US" sz="5400" dirty="0"/>
-            </a:br>
-            <a:r>
-              <a:rPr lang="en-US" sz="5400" dirty="0"/>
-              <a:t>These ratings will appear only for 1 second.  In order to take all the ratings in, try to expand your attention to the four corners of the screen.</a:t>
-            </a:r>
+            <a:r>
+              <a:rPr lang="en-US" sz="6600" dirty="0"/>
+              <a:t>Following these pictures you will then asked to choose whether the initial face you saw was taken from the group of 12 faces you saw or not</a:t>
+            </a:r>
+            <a:r>
+              <a:rPr lang="en-US" sz="6600" b="1" dirty="0"/>
+              <a:t>.  </a:t>
+            </a:r>
+            <a:endParaRPr lang="en-US" sz="6600" dirty="0">
+              <a:latin typeface="Arial" panose="020B0604020202020204" pitchFamily="34" charset="0"/>
+              <a:cs typeface="Arial" panose="020B0604020202020204" pitchFamily="34" charset="0"/>
+            </a:endParaRPr>
           </a:p>
         </p:txBody>
       </p:sp>
@@ -4302,10 +4382,10 @@
       </p:sp>
       <p:pic>
         <p:nvPicPr>
-          <p:cNvPr id="4" name="Picture 3">
+          <p:cNvPr id="3" name="Picture 2">
             <a:extLst>
               <a:ext uri="{FF2B5EF4-FFF2-40B4-BE49-F238E27FC236}">
-                <a16:creationId xmlns:a16="http://schemas.microsoft.com/office/drawing/2014/main" id="{840FD001-BC2A-5E43-AFB2-21BD3C7AF71A}"/>
+                <a16:creationId xmlns:a16="http://schemas.microsoft.com/office/drawing/2014/main" id="{1975E5BB-17A4-4DA1-80E6-635403CC24A3}"/>
               </a:ext>
             </a:extLst>
           </p:cNvPr>
@@ -4316,381 +4396,19 @@
         </p:nvPicPr>
         <p:blipFill rotWithShape="1">
           <a:blip r:embed="rId2"/>
-          <a:srcRect t="3813" b="2954"/>
+          <a:srcRect l="16734" t="30686" r="12714" b="33179"/>
           <a:stretch/>
         </p:blipFill>
         <p:spPr>
           <a:xfrm>
-            <a:off x="6985000" y="4800600"/>
-            <a:ext cx="12434609" cy="8915400"/>
+            <a:off x="180534" y="5377069"/>
+            <a:ext cx="24022932" cy="7245627"/>
           </a:xfrm>
           <a:prstGeom prst="rect">
             <a:avLst/>
           </a:prstGeom>
         </p:spPr>
       </p:pic>
-    </p:spTree>
-    <p:extLst>
-      <p:ext uri="{BB962C8B-B14F-4D97-AF65-F5344CB8AC3E}">
-        <p14:creationId xmlns:p14="http://schemas.microsoft.com/office/powerpoint/2010/main" val="2034355920"/>
-      </p:ext>
-    </p:extLst>
-  </p:cSld>
-  <p:clrMapOvr>
-    <a:masterClrMapping/>
-  </p:clrMapOvr>
-</p:sld>
-</file>
-
-<file path=ppt/slides/slide6.xml><?xml version="1.0" encoding="utf-8"?>
-<p:sld xmlns:a="http://schemas.openxmlformats.org/drawingml/2006/main" xmlns:r="http://schemas.openxmlformats.org/officeDocument/2006/relationships" xmlns:p="http://schemas.openxmlformats.org/presentationml/2006/main">
-  <p:cSld>
-    <p:bg>
-      <p:bgPr>
-        <a:solidFill>
-          <a:srgbClr val="AAAAAA"/>
-        </a:solidFill>
-        <a:effectLst/>
-      </p:bgPr>
-    </p:bg>
-    <p:spTree>
-      <p:nvGrpSpPr>
-        <p:cNvPr id="1" name=""/>
-        <p:cNvGrpSpPr/>
-        <p:nvPr/>
-      </p:nvGrpSpPr>
-      <p:grpSpPr>
-        <a:xfrm>
-          <a:off x="0" y="0"/>
-          <a:ext cx="0" cy="0"/>
-          <a:chOff x="0" y="0"/>
-          <a:chExt cx="0" cy="0"/>
-        </a:xfrm>
-      </p:grpSpPr>
-      <p:sp>
-        <p:nvSpPr>
-          <p:cNvPr id="2" name="Title 1">
-            <a:extLst>
-              <a:ext uri="{FF2B5EF4-FFF2-40B4-BE49-F238E27FC236}">
-                <a16:creationId xmlns:a16="http://schemas.microsoft.com/office/drawing/2014/main" id="{21DCC761-EEA5-3B4F-AEC8-ED98BC41E974}"/>
-              </a:ext>
-            </a:extLst>
-          </p:cNvPr>
-          <p:cNvSpPr>
-            <a:spLocks noGrp="1"/>
-          </p:cNvSpPr>
-          <p:nvPr>
-            <p:ph type="ctrTitle"/>
-          </p:nvPr>
-        </p:nvSpPr>
-        <p:spPr>
-          <a:xfrm>
-            <a:off x="457200" y="3408336"/>
-            <a:ext cx="23742782" cy="1484589"/>
-          </a:xfrm>
-        </p:spPr>
-        <p:txBody>
-          <a:bodyPr>
-            <a:noAutofit/>
-          </a:bodyPr>
-          <a:lstStyle/>
-          <a:p>
-            <a:pPr algn="l"/>
-            <a:r>
-              <a:rPr lang="en-US" sz="6600" dirty="0"/>
-              <a:t>Following these pictures you will then asked to choose whether the initial face you saw, was taken the group of 12 faces you saw or not</a:t>
-            </a:r>
-            <a:r>
-              <a:rPr lang="en-US" sz="6600" b="1" dirty="0"/>
-              <a:t>.  </a:t>
-            </a:r>
-            <a:r>
-              <a:rPr lang="en-US" sz="6600" dirty="0"/>
-              <a:t>Use the mouse to choose the group from which these responses were taken? </a:t>
-            </a:r>
-            <a:endParaRPr lang="en-US" sz="6600" dirty="0">
-              <a:latin typeface="Arial" panose="020B0604020202020204" pitchFamily="34" charset="0"/>
-              <a:cs typeface="Arial" panose="020B0604020202020204" pitchFamily="34" charset="0"/>
-            </a:endParaRPr>
-          </a:p>
-        </p:txBody>
-      </p:sp>
-      <p:sp>
-        <p:nvSpPr>
-          <p:cNvPr id="10" name="Subtitle 2">
-            <a:extLst>
-              <a:ext uri="{FF2B5EF4-FFF2-40B4-BE49-F238E27FC236}">
-                <a16:creationId xmlns:a16="http://schemas.microsoft.com/office/drawing/2014/main" id="{7B657E54-FB0B-9846-9D3A-5F4CAB62197F}"/>
-              </a:ext>
-            </a:extLst>
-          </p:cNvPr>
-          <p:cNvSpPr txBox="1">
-            <a:spLocks/>
-          </p:cNvSpPr>
-          <p:nvPr/>
-        </p:nvSpPr>
-        <p:spPr>
-          <a:xfrm>
-            <a:off x="6379134" y="10910125"/>
-            <a:ext cx="10163955" cy="2539913"/>
-          </a:xfrm>
-          <a:prstGeom prst="rect">
-            <a:avLst/>
-          </a:prstGeom>
-        </p:spPr>
-        <p:txBody>
-          <a:bodyPr vert="horz" lIns="182856" tIns="91428" rIns="182856" bIns="91428" rtlCol="0">
-            <a:normAutofit/>
-          </a:bodyPr>
-          <a:lstStyle>
-            <a:lvl1pPr marL="0" indent="0" algn="l" defTabSz="914400" rtl="0" eaLnBrk="1" latinLnBrk="0" hangingPunct="1">
-              <a:lnSpc>
-                <a:spcPct val="90000"/>
-              </a:lnSpc>
-              <a:spcBef>
-                <a:spcPts val="1200"/>
-              </a:spcBef>
-              <a:buClr>
-                <a:schemeClr val="accent1">
-                  <a:lumMod val="75000"/>
-                </a:schemeClr>
-              </a:buClr>
-              <a:buSzPct val="85000"/>
-              <a:buFont typeface="Wingdings" pitchFamily="2" charset="2"/>
-              <a:buNone/>
-              <a:defRPr sz="2200" kern="1200">
-                <a:solidFill>
-                  <a:schemeClr val="tx1"/>
-                </a:solidFill>
-                <a:latin typeface="+mn-lt"/>
-                <a:ea typeface="+mn-ea"/>
-                <a:cs typeface="+mn-cs"/>
-              </a:defRPr>
-            </a:lvl1pPr>
-            <a:lvl2pPr marL="457200" indent="0" algn="ctr" defTabSz="914400" rtl="0" eaLnBrk="1" latinLnBrk="0" hangingPunct="1">
-              <a:lnSpc>
-                <a:spcPct val="90000"/>
-              </a:lnSpc>
-              <a:spcBef>
-                <a:spcPts val="400"/>
-              </a:spcBef>
-              <a:spcAft>
-                <a:spcPts val="200"/>
-              </a:spcAft>
-              <a:buClr>
-                <a:schemeClr val="accent1">
-                  <a:lumMod val="75000"/>
-                </a:schemeClr>
-              </a:buClr>
-              <a:buSzPct val="85000"/>
-              <a:buFont typeface="Wingdings" pitchFamily="2" charset="2"/>
-              <a:buNone/>
-              <a:defRPr sz="2800" kern="1200">
-                <a:solidFill>
-                  <a:schemeClr val="tx1"/>
-                </a:solidFill>
-                <a:latin typeface="+mn-lt"/>
-                <a:ea typeface="+mn-ea"/>
-                <a:cs typeface="+mn-cs"/>
-              </a:defRPr>
-            </a:lvl2pPr>
-            <a:lvl3pPr marL="914400" indent="0" algn="ctr" defTabSz="914400" rtl="0" eaLnBrk="1" latinLnBrk="0" hangingPunct="1">
-              <a:lnSpc>
-                <a:spcPct val="90000"/>
-              </a:lnSpc>
-              <a:spcBef>
-                <a:spcPts val="400"/>
-              </a:spcBef>
-              <a:spcAft>
-                <a:spcPts val="200"/>
-              </a:spcAft>
-              <a:buClr>
-                <a:schemeClr val="accent1">
-                  <a:lumMod val="75000"/>
-                </a:schemeClr>
-              </a:buClr>
-              <a:buSzPct val="85000"/>
-              <a:buFont typeface="Wingdings" pitchFamily="2" charset="2"/>
-              <a:buNone/>
-              <a:defRPr sz="2400" kern="1200">
-                <a:solidFill>
-                  <a:schemeClr val="tx1"/>
-                </a:solidFill>
-                <a:latin typeface="+mn-lt"/>
-                <a:ea typeface="+mn-ea"/>
-                <a:cs typeface="+mn-cs"/>
-              </a:defRPr>
-            </a:lvl3pPr>
-            <a:lvl4pPr marL="1371600" indent="0" algn="ctr" defTabSz="914400" rtl="0" eaLnBrk="1" latinLnBrk="0" hangingPunct="1">
-              <a:lnSpc>
-                <a:spcPct val="90000"/>
-              </a:lnSpc>
-              <a:spcBef>
-                <a:spcPts val="400"/>
-              </a:spcBef>
-              <a:spcAft>
-                <a:spcPts val="200"/>
-              </a:spcAft>
-              <a:buClr>
-                <a:schemeClr val="accent1">
-                  <a:lumMod val="75000"/>
-                </a:schemeClr>
-              </a:buClr>
-              <a:buSzPct val="85000"/>
-              <a:buFont typeface="Wingdings" pitchFamily="2" charset="2"/>
-              <a:buNone/>
-              <a:defRPr sz="2000" kern="1200">
-                <a:solidFill>
-                  <a:schemeClr val="tx1"/>
-                </a:solidFill>
-                <a:latin typeface="+mn-lt"/>
-                <a:ea typeface="+mn-ea"/>
-                <a:cs typeface="+mn-cs"/>
-              </a:defRPr>
-            </a:lvl4pPr>
-            <a:lvl5pPr marL="1828800" indent="0" algn="ctr" defTabSz="914400" rtl="0" eaLnBrk="1" latinLnBrk="0" hangingPunct="1">
-              <a:lnSpc>
-                <a:spcPct val="90000"/>
-              </a:lnSpc>
-              <a:spcBef>
-                <a:spcPts val="400"/>
-              </a:spcBef>
-              <a:spcAft>
-                <a:spcPts val="200"/>
-              </a:spcAft>
-              <a:buClr>
-                <a:schemeClr val="accent1">
-                  <a:lumMod val="75000"/>
-                </a:schemeClr>
-              </a:buClr>
-              <a:buSzPct val="85000"/>
-              <a:buFont typeface="Wingdings" pitchFamily="2" charset="2"/>
-              <a:buNone/>
-              <a:defRPr sz="2000" kern="1200">
-                <a:solidFill>
-                  <a:schemeClr val="tx1"/>
-                </a:solidFill>
-                <a:latin typeface="+mn-lt"/>
-                <a:ea typeface="+mn-ea"/>
-                <a:cs typeface="+mn-cs"/>
-              </a:defRPr>
-            </a:lvl5pPr>
-            <a:lvl6pPr marL="2286000" indent="0" algn="ctr" defTabSz="914400" rtl="0" eaLnBrk="1" latinLnBrk="0" hangingPunct="1">
-              <a:lnSpc>
-                <a:spcPct val="90000"/>
-              </a:lnSpc>
-              <a:spcBef>
-                <a:spcPts val="400"/>
-              </a:spcBef>
-              <a:spcAft>
-                <a:spcPts val="200"/>
-              </a:spcAft>
-              <a:buClr>
-                <a:schemeClr val="accent1">
-                  <a:lumMod val="75000"/>
-                </a:schemeClr>
-              </a:buClr>
-              <a:buSzPct val="85000"/>
-              <a:buFont typeface="Wingdings" pitchFamily="2" charset="2"/>
-              <a:buNone/>
-              <a:defRPr sz="2000" kern="1200">
-                <a:solidFill>
-                  <a:schemeClr val="tx1"/>
-                </a:solidFill>
-                <a:latin typeface="+mn-lt"/>
-                <a:ea typeface="+mn-ea"/>
-                <a:cs typeface="+mn-cs"/>
-              </a:defRPr>
-            </a:lvl6pPr>
-            <a:lvl7pPr marL="2743200" indent="0" algn="ctr" defTabSz="914400" rtl="0" eaLnBrk="1" latinLnBrk="0" hangingPunct="1">
-              <a:lnSpc>
-                <a:spcPct val="90000"/>
-              </a:lnSpc>
-              <a:spcBef>
-                <a:spcPts val="400"/>
-              </a:spcBef>
-              <a:spcAft>
-                <a:spcPts val="200"/>
-              </a:spcAft>
-              <a:buClr>
-                <a:schemeClr val="accent1">
-                  <a:lumMod val="75000"/>
-                </a:schemeClr>
-              </a:buClr>
-              <a:buSzPct val="85000"/>
-              <a:buFont typeface="Wingdings" pitchFamily="2" charset="2"/>
-              <a:buNone/>
-              <a:defRPr sz="2000" kern="1200">
-                <a:solidFill>
-                  <a:schemeClr val="tx1"/>
-                </a:solidFill>
-                <a:latin typeface="+mn-lt"/>
-                <a:ea typeface="+mn-ea"/>
-                <a:cs typeface="+mn-cs"/>
-              </a:defRPr>
-            </a:lvl7pPr>
-            <a:lvl8pPr marL="3200400" indent="0" algn="ctr" defTabSz="914400" rtl="0" eaLnBrk="1" latinLnBrk="0" hangingPunct="1">
-              <a:lnSpc>
-                <a:spcPct val="90000"/>
-              </a:lnSpc>
-              <a:spcBef>
-                <a:spcPts val="400"/>
-              </a:spcBef>
-              <a:spcAft>
-                <a:spcPts val="200"/>
-              </a:spcAft>
-              <a:buClr>
-                <a:schemeClr val="accent1">
-                  <a:lumMod val="75000"/>
-                </a:schemeClr>
-              </a:buClr>
-              <a:buSzPct val="85000"/>
-              <a:buFont typeface="Wingdings" pitchFamily="2" charset="2"/>
-              <a:buNone/>
-              <a:defRPr sz="2000" kern="1200">
-                <a:solidFill>
-                  <a:schemeClr val="tx1"/>
-                </a:solidFill>
-                <a:latin typeface="+mn-lt"/>
-                <a:ea typeface="+mn-ea"/>
-                <a:cs typeface="+mn-cs"/>
-              </a:defRPr>
-            </a:lvl8pPr>
-            <a:lvl9pPr marL="3657600" indent="0" algn="ctr" defTabSz="914400" rtl="0" eaLnBrk="1" latinLnBrk="0" hangingPunct="1">
-              <a:lnSpc>
-                <a:spcPct val="90000"/>
-              </a:lnSpc>
-              <a:spcBef>
-                <a:spcPts val="400"/>
-              </a:spcBef>
-              <a:spcAft>
-                <a:spcPts val="200"/>
-              </a:spcAft>
-              <a:buClr>
-                <a:schemeClr val="accent1">
-                  <a:lumMod val="75000"/>
-                </a:schemeClr>
-              </a:buClr>
-              <a:buSzPct val="85000"/>
-              <a:buFont typeface="Wingdings" pitchFamily="2" charset="2"/>
-              <a:buNone/>
-              <a:defRPr sz="2000" kern="1200">
-                <a:solidFill>
-                  <a:schemeClr val="tx1"/>
-                </a:solidFill>
-                <a:latin typeface="+mn-lt"/>
-                <a:ea typeface="+mn-ea"/>
-                <a:cs typeface="+mn-cs"/>
-              </a:defRPr>
-            </a:lvl9pPr>
-          </a:lstStyle>
-          <a:p>
-            <a:endParaRPr lang="en-US" sz="4000" dirty="0">
-              <a:latin typeface="Arial" panose="020B0604020202020204" pitchFamily="34" charset="0"/>
-            </a:endParaRPr>
-          </a:p>
-        </p:txBody>
-      </p:sp>
     </p:spTree>
     <p:extLst>
       <p:ext uri="{BB962C8B-B14F-4D97-AF65-F5344CB8AC3E}">
@@ -4743,8 +4461,8 @@
         </p:nvSpPr>
         <p:spPr>
           <a:xfrm>
-            <a:off x="721291" y="6015900"/>
-            <a:ext cx="22941418" cy="6740307"/>
+            <a:off x="721291" y="5141257"/>
+            <a:ext cx="22941418" cy="4524315"/>
           </a:xfrm>
           <a:prstGeom prst="rect">
             <a:avLst/>
@@ -4771,16 +4489,6 @@
               <a:latin typeface="Arial" panose="020B0604020202020204" pitchFamily="34" charset="0"/>
               <a:cs typeface="Arial" panose="020B0604020202020204" pitchFamily="34" charset="0"/>
             </a:endParaRPr>
-          </a:p>
-          <a:p>
-            <a:pPr algn="ctr"/>
-            <a:r>
-              <a:rPr lang="en-US" sz="7200" dirty="0">
-                <a:latin typeface="Arial" panose="020B0604020202020204" pitchFamily="34" charset="0"/>
-                <a:cs typeface="Arial" panose="020B0604020202020204" pitchFamily="34" charset="0"/>
-              </a:rPr>
-              <a:t>Notice that the pictures in the practice round are presented just to illustrate the goal of the study.   </a:t>
-            </a:r>
           </a:p>
           <a:p>
             <a:pPr algn="ctr"/>

</xml_diff>